<commit_message>
Updating to new logo / pycharm stuff.
</commit_message>
<xml_diff>
--- a/presentation/PythonRethinkDB_cvsc.pptx
+++ b/presentation/PythonRethinkDB_cvsc.pptx
@@ -238,7 +238,7 @@
           <a:p>
             <a:fld id="{784AA43A-3F76-4A13-9CD6-36134EB429E3}" type="datetimeFigureOut">
               <a:rPr lang="en-US"/>
-              <a:t>3/8/2016</a:t>
+              <a:t>3/9/2016</a:t>
             </a:fld>
             <a:endParaRPr/>
           </a:p>
@@ -403,7 +403,7 @@
           <a:p>
             <a:fld id="{5F674A4F-2B7A-4ECB-A400-260B2FFC03C1}" type="datetimeFigureOut">
               <a:rPr lang="en-US"/>
-              <a:t>3/8/2016</a:t>
+              <a:t>3/9/2016</a:t>
             </a:fld>
             <a:endParaRPr/>
           </a:p>
@@ -859,7 +859,7 @@
             <a:fld id="{B61BEF0D-F0BB-DE4B-95CE-6DB70DBA9567}" type="datetimeFigureOut">
               <a:rPr lang="en-US" smtClean="0"/>
               <a:pPr/>
-              <a:t>3/8/2016</a:t>
+              <a:t>3/9/2016</a:t>
             </a:fld>
             <a:endParaRPr lang="en-US" dirty="0"/>
           </a:p>
@@ -1218,7 +1218,7 @@
             <a:fld id="{9AFE8FB1-0A7A-443E-AAF7-31D4FA1AA312}" type="datetimeFigureOut">
               <a:rPr lang="en-US" smtClean="0"/>
               <a:pPr/>
-              <a:t>3/8/2016</a:t>
+              <a:t>3/9/2016</a:t>
             </a:fld>
             <a:endParaRPr lang="en-US"/>
           </a:p>
@@ -1628,7 +1628,7 @@
             <a:fld id="{9AFE8FB1-0A7A-443E-AAF7-31D4FA1AA312}" type="datetimeFigureOut">
               <a:rPr lang="en-US" smtClean="0"/>
               <a:pPr/>
-              <a:t>3/8/2016</a:t>
+              <a:t>3/9/2016</a:t>
             </a:fld>
             <a:endParaRPr lang="en-US"/>
           </a:p>
@@ -1973,7 +1973,7 @@
             <a:fld id="{9AFE8FB1-0A7A-443E-AAF7-31D4FA1AA312}" type="datetimeFigureOut">
               <a:rPr lang="en-US" smtClean="0"/>
               <a:pPr/>
-              <a:t>3/8/2016</a:t>
+              <a:t>3/9/2016</a:t>
             </a:fld>
             <a:endParaRPr lang="en-US"/>
           </a:p>
@@ -2302,7 +2302,7 @@
             <a:fld id="{9AFE8FB1-0A7A-443E-AAF7-31D4FA1AA312}" type="datetimeFigureOut">
               <a:rPr lang="en-US" smtClean="0"/>
               <a:pPr/>
-              <a:t>3/8/2016</a:t>
+              <a:t>3/9/2016</a:t>
             </a:fld>
             <a:endParaRPr lang="en-US"/>
           </a:p>
@@ -2707,7 +2707,7 @@
             <a:fld id="{9AFE8FB1-0A7A-443E-AAF7-31D4FA1AA312}" type="datetimeFigureOut">
               <a:rPr lang="en-US" smtClean="0"/>
               <a:pPr/>
-              <a:t>3/8/2016</a:t>
+              <a:t>3/9/2016</a:t>
             </a:fld>
             <a:endParaRPr lang="en-US"/>
           </a:p>
@@ -2972,7 +2972,7 @@
           <a:p>
             <a:fld id="{9AFE8FB1-0A7A-443E-AAF7-31D4FA1AA312}" type="datetimeFigureOut">
               <a:rPr lang="en-US" smtClean="0"/>
-              <a:t>3/8/2016</a:t>
+              <a:t>3/9/2016</a:t>
             </a:fld>
             <a:endParaRPr lang="en-US"/>
           </a:p>
@@ -3253,7 +3253,7 @@
           <a:p>
             <a:fld id="{9AFE8FB1-0A7A-443E-AAF7-31D4FA1AA312}" type="datetimeFigureOut">
               <a:rPr lang="en-US" smtClean="0"/>
-              <a:t>3/8/2016</a:t>
+              <a:t>3/9/2016</a:t>
             </a:fld>
             <a:endParaRPr lang="en-US"/>
           </a:p>
@@ -3534,7 +3534,7 @@
           <a:p>
             <a:fld id="{9AFE8FB1-0A7A-443E-AAF7-31D4FA1AA312}" type="datetimeFigureOut">
               <a:rPr lang="en-US" smtClean="0"/>
-              <a:t>3/8/2016</a:t>
+              <a:t>3/9/2016</a:t>
             </a:fld>
             <a:endParaRPr lang="en-US"/>
           </a:p>
@@ -3882,7 +3882,7 @@
           <a:p>
             <a:fld id="{9AFE8FB1-0A7A-443E-AAF7-31D4FA1AA312}" type="datetimeFigureOut">
               <a:rPr lang="en-US" smtClean="0"/>
-              <a:t>3/8/2016</a:t>
+              <a:t>3/9/2016</a:t>
             </a:fld>
             <a:endParaRPr lang="en-US"/>
           </a:p>
@@ -4224,7 +4224,7 @@
           <a:p>
             <a:fld id="{9AFE8FB1-0A7A-443E-AAF7-31D4FA1AA312}" type="datetimeFigureOut">
               <a:rPr lang="en-US" smtClean="0"/>
-              <a:t>3/8/2016</a:t>
+              <a:t>3/9/2016</a:t>
             </a:fld>
             <a:endParaRPr lang="en-US"/>
           </a:p>
@@ -4700,7 +4700,7 @@
           <a:p>
             <a:fld id="{9AFE8FB1-0A7A-443E-AAF7-31D4FA1AA312}" type="datetimeFigureOut">
               <a:rPr lang="en-US" smtClean="0"/>
-              <a:t>3/8/2016</a:t>
+              <a:t>3/9/2016</a:t>
             </a:fld>
             <a:endParaRPr lang="en-US"/>
           </a:p>
@@ -4924,7 +4924,7 @@
           <a:p>
             <a:fld id="{9AFE8FB1-0A7A-443E-AAF7-31D4FA1AA312}" type="datetimeFigureOut">
               <a:rPr lang="en-US" smtClean="0"/>
-              <a:t>3/8/2016</a:t>
+              <a:t>3/9/2016</a:t>
             </a:fld>
             <a:endParaRPr lang="en-US"/>
           </a:p>
@@ -5120,7 +5120,7 @@
           <a:p>
             <a:fld id="{9AFE8FB1-0A7A-443E-AAF7-31D4FA1AA312}" type="datetimeFigureOut">
               <a:rPr lang="en-US" smtClean="0"/>
-              <a:t>3/8/2016</a:t>
+              <a:t>3/9/2016</a:t>
             </a:fld>
             <a:endParaRPr lang="en-US"/>
           </a:p>
@@ -5472,7 +5472,7 @@
           <a:p>
             <a:fld id="{9AFE8FB1-0A7A-443E-AAF7-31D4FA1AA312}" type="datetimeFigureOut">
               <a:rPr lang="en-US" smtClean="0"/>
-              <a:t>3/8/2016</a:t>
+              <a:t>3/9/2016</a:t>
             </a:fld>
             <a:endParaRPr lang="en-US"/>
           </a:p>
@@ -5836,7 +5836,7 @@
           <a:p>
             <a:fld id="{9AFE8FB1-0A7A-443E-AAF7-31D4FA1AA312}" type="datetimeFigureOut">
               <a:rPr lang="en-US" smtClean="0"/>
-              <a:t>3/8/2016</a:t>
+              <a:t>3/9/2016</a:t>
             </a:fld>
             <a:endParaRPr lang="en-US"/>
           </a:p>
@@ -7973,7 +7973,7 @@
             <a:fld id="{9AFE8FB1-0A7A-443E-AAF7-31D4FA1AA312}" type="datetimeFigureOut">
               <a:rPr lang="en-US" smtClean="0"/>
               <a:pPr/>
-              <a:t>3/8/2016</a:t>
+              <a:t>3/9/2016</a:t>
             </a:fld>
             <a:endParaRPr lang="en-US"/>
           </a:p>
@@ -8526,9 +8526,77 @@
           <a:chExt cx="0" cy="0"/>
         </a:xfrm>
       </p:grpSpPr>
+      <p:sp>
+        <p:nvSpPr>
+          <p:cNvPr id="7" name="TextBox 6"/>
+          <p:cNvSpPr txBox="1"/>
+          <p:nvPr/>
+        </p:nvSpPr>
+        <p:spPr>
+          <a:xfrm>
+            <a:off x="3198812" y="2362200"/>
+            <a:ext cx="6639318" cy="1089529"/>
+          </a:xfrm>
+          <a:prstGeom prst="rect">
+            <a:avLst/>
+          </a:prstGeom>
+          <a:noFill/>
+        </p:spPr>
+        <p:txBody>
+          <a:bodyPr wrap="none" rtlCol="0">
+            <a:spAutoFit/>
+          </a:bodyPr>
+          <a:lstStyle/>
+          <a:p>
+            <a:pPr>
+              <a:lnSpc>
+                <a:spcPct val="90000"/>
+              </a:lnSpc>
+            </a:pPr>
+            <a:endParaRPr lang="en-US" sz="2400" dirty="0" smtClean="0">
+              <a:latin typeface="Cambria" panose="02040503050406030204" pitchFamily="18" charset="0"/>
+            </a:endParaRPr>
+          </a:p>
+          <a:p>
+            <a:pPr>
+              <a:lnSpc>
+                <a:spcPct val="90000"/>
+              </a:lnSpc>
+            </a:pPr>
+            <a:r>
+              <a:rPr lang="en-US" sz="2400" dirty="0" smtClean="0">
+                <a:latin typeface="Cambria" panose="02040503050406030204" pitchFamily="18" charset="0"/>
+              </a:rPr>
+              <a:t>The open-source database for the </a:t>
+            </a:r>
+            <a:r>
+              <a:rPr lang="en-US" sz="2400" b="1" dirty="0" smtClean="0">
+                <a:latin typeface="Cambria" panose="02040503050406030204" pitchFamily="18" charset="0"/>
+              </a:rPr>
+              <a:t>real-time</a:t>
+            </a:r>
+            <a:r>
+              <a:rPr lang="en-US" sz="2400" dirty="0" smtClean="0">
+                <a:latin typeface="Cambria" panose="02040503050406030204" pitchFamily="18" charset="0"/>
+              </a:rPr>
+              <a:t> web.</a:t>
+            </a:r>
+          </a:p>
+          <a:p>
+            <a:pPr>
+              <a:lnSpc>
+                <a:spcPct val="90000"/>
+              </a:lnSpc>
+            </a:pPr>
+            <a:endParaRPr lang="en-US" sz="2400" dirty="0">
+              <a:latin typeface="Cambria" panose="02040503050406030204" pitchFamily="18" charset="0"/>
+            </a:endParaRPr>
+          </a:p>
+        </p:txBody>
+      </p:sp>
       <p:pic>
         <p:nvPicPr>
-          <p:cNvPr id="4" name="Picture 3"/>
+          <p:cNvPr id="2" name="Picture 1"/>
           <p:cNvPicPr>
             <a:picLocks noChangeAspect="1"/>
           </p:cNvPicPr>
@@ -8548,85 +8616,17 @@
         </p:blipFill>
         <p:spPr>
           <a:xfrm>
-            <a:off x="2132012" y="152400"/>
-            <a:ext cx="7930443" cy="2379133"/>
+            <a:off x="2665412" y="3200400"/>
+            <a:ext cx="8268854" cy="3343742"/>
           </a:xfrm>
           <a:prstGeom prst="rect">
             <a:avLst/>
           </a:prstGeom>
         </p:spPr>
       </p:pic>
-      <p:sp>
-        <p:nvSpPr>
-          <p:cNvPr id="7" name="TextBox 6"/>
-          <p:cNvSpPr txBox="1"/>
-          <p:nvPr/>
-        </p:nvSpPr>
-        <p:spPr>
-          <a:xfrm>
-            <a:off x="3198812" y="2362200"/>
-            <a:ext cx="6639318" cy="1089529"/>
-          </a:xfrm>
-          <a:prstGeom prst="rect">
-            <a:avLst/>
-          </a:prstGeom>
-          <a:noFill/>
-        </p:spPr>
-        <p:txBody>
-          <a:bodyPr wrap="none" rtlCol="0">
-            <a:spAutoFit/>
-          </a:bodyPr>
-          <a:lstStyle/>
-          <a:p>
-            <a:pPr>
-              <a:lnSpc>
-                <a:spcPct val="90000"/>
-              </a:lnSpc>
-            </a:pPr>
-            <a:endParaRPr lang="en-US" sz="2400" dirty="0" smtClean="0">
-              <a:latin typeface="Cambria" panose="02040503050406030204" pitchFamily="18" charset="0"/>
-            </a:endParaRPr>
-          </a:p>
-          <a:p>
-            <a:pPr>
-              <a:lnSpc>
-                <a:spcPct val="90000"/>
-              </a:lnSpc>
-            </a:pPr>
-            <a:r>
-              <a:rPr lang="en-US" sz="2400" dirty="0" smtClean="0">
-                <a:latin typeface="Cambria" panose="02040503050406030204" pitchFamily="18" charset="0"/>
-              </a:rPr>
-              <a:t>The open-source database for the </a:t>
-            </a:r>
-            <a:r>
-              <a:rPr lang="en-US" sz="2400" b="1" dirty="0" smtClean="0">
-                <a:latin typeface="Cambria" panose="02040503050406030204" pitchFamily="18" charset="0"/>
-              </a:rPr>
-              <a:t>real-time</a:t>
-            </a:r>
-            <a:r>
-              <a:rPr lang="en-US" sz="2400" dirty="0" smtClean="0">
-                <a:latin typeface="Cambria" panose="02040503050406030204" pitchFamily="18" charset="0"/>
-              </a:rPr>
-              <a:t> web.</a:t>
-            </a:r>
-          </a:p>
-          <a:p>
-            <a:pPr>
-              <a:lnSpc>
-                <a:spcPct val="90000"/>
-              </a:lnSpc>
-            </a:pPr>
-            <a:endParaRPr lang="en-US" sz="2400" dirty="0">
-              <a:latin typeface="Cambria" panose="02040503050406030204" pitchFamily="18" charset="0"/>
-            </a:endParaRPr>
-          </a:p>
-        </p:txBody>
-      </p:sp>
       <p:pic>
         <p:nvPicPr>
-          <p:cNvPr id="2" name="Picture 1"/>
+          <p:cNvPr id="3" name="Picture 2"/>
           <p:cNvPicPr>
             <a:picLocks noChangeAspect="1"/>
           </p:cNvPicPr>
@@ -8646,8 +8646,8 @@
         </p:blipFill>
         <p:spPr>
           <a:xfrm>
-            <a:off x="2665412" y="3200400"/>
-            <a:ext cx="8268854" cy="3343742"/>
+            <a:off x="1370012" y="-336804"/>
+            <a:ext cx="10058400" cy="3118104"/>
           </a:xfrm>
           <a:prstGeom prst="rect">
             <a:avLst/>
@@ -9112,7 +9112,6 @@
               <a:rPr lang="en-US" dirty="0" smtClean="0"/>
               <a:t>and/or a framework for live updating from the web server to the client exist and work well, most databases are not built for live streaming. </a:t>
             </a:r>
-            <a:endParaRPr lang="en-US" dirty="0" smtClean="0"/>
           </a:p>
           <a:p>
             <a:endParaRPr lang="en-US" dirty="0" smtClean="0"/>
@@ -9124,11 +9123,7 @@
             </a:pPr>
             <a:r>
               <a:rPr lang="en-US" dirty="0" smtClean="0"/>
-              <a:t>It can be done (SQL Server even has a way to maintain a persistent connection using SQL Server Broker</a:t>
-            </a:r>
-            <a:r>
-              <a:rPr lang="en-US" dirty="0" smtClean="0"/>
-              <a:t>)</a:t>
+              <a:t>It can be done (SQL Server even has a way to maintain a persistent connection using SQL Server Broker)</a:t>
             </a:r>
           </a:p>
           <a:p>
@@ -9360,11 +9355,7 @@
             </a:r>
             <a:r>
               <a:rPr lang="en-US" dirty="0" smtClean="0"/>
-              <a:t> allow you to monitor a table for changes</a:t>
-            </a:r>
-            <a:r>
-              <a:rPr lang="en-US" dirty="0" smtClean="0"/>
-              <a:t>. Similar to subscribing to a message queue.</a:t>
+              <a:t> allow you to monitor a table for changes. Similar to subscribing to a message queue.</a:t>
             </a:r>
           </a:p>
           <a:p>
@@ -11206,23 +11197,8 @@
               <a:rPr lang="en-US" dirty="0" smtClean="0">
                 <a:sym typeface="Wingdings" panose="05000000000000000000" pitchFamily="2" charset="2"/>
               </a:rPr>
-              <a:t>Embedded into the client </a:t>
-            </a:r>
-            <a:r>
-              <a:rPr lang="en-US" dirty="0" smtClean="0">
-                <a:sym typeface="Wingdings" panose="05000000000000000000" pitchFamily="2" charset="2"/>
-              </a:rPr>
-              <a:t>language</a:t>
-            </a:r>
-            <a:r>
-              <a:rPr lang="en-US" dirty="0" smtClean="0">
-                <a:sym typeface="Wingdings" panose="05000000000000000000" pitchFamily="2" charset="2"/>
-              </a:rPr>
-              <a:t>. If you know DBAPI / PEP 249 it is easy. </a:t>
-            </a:r>
-            <a:endParaRPr lang="en-US" dirty="0" smtClean="0">
-              <a:sym typeface="Wingdings" panose="05000000000000000000" pitchFamily="2" charset="2"/>
-            </a:endParaRPr>
+              <a:t>Embedded into the client language. If you know DBAPI / PEP 249 it is easy. </a:t>
+            </a:r>
           </a:p>
           <a:p>
             <a:pPr lvl="1"/>
@@ -12002,7 +11978,6 @@
               <a:rPr lang="en-US" dirty="0" smtClean="0"/>
               <a:t>– What real-solutions have you seen / used? </a:t>
             </a:r>
-            <a:endParaRPr lang="en-US" dirty="0" smtClean="0"/>
           </a:p>
           <a:p>
             <a:endParaRPr lang="en-US" dirty="0" smtClean="0"/>
@@ -12016,7 +11991,6 @@
               <a:rPr lang="en-US" dirty="0" smtClean="0"/>
               <a:t>Long-Polling (making a connection to the web server and waiting for a response to be returned) is not very efficient. Once data is actually returned we must handle the http-based approach of closing after the request and then opening a new one. This really doesn’t work well for streaming data. </a:t>
             </a:r>
-            <a:endParaRPr lang="en-US" dirty="0" smtClean="0"/>
           </a:p>
           <a:p>
             <a:endParaRPr lang="en-US" dirty="0" smtClean="0"/>

</xml_diff>